<commit_message>
minor adj in presentation
</commit_message>
<xml_diff>
--- a/marketing/presentation.pptx
+++ b/marketing/presentation.pptx
@@ -6342,19 +6342,19 @@
           <a:p>
             <a:r>
               <a:rPr lang="en-FI" sz="3600" dirty="0"/>
-              <a:t>Cut costs by planning your near-future consumption!</a:t>
+              <a:t>Cut costs by planning!</a:t>
             </a:r>
           </a:p>
           <a:p>
             <a:r>
               <a:rPr lang="en-FI" sz="3600" dirty="0"/>
-              <a:t>Is it cheaper to charge your electric car tomorrow or perhaps the day after tomorrow?</a:t>
+              <a:t>Is it cheaper to charge your electric car tomorrow or the day after?</a:t>
             </a:r>
           </a:p>
           <a:p>
             <a:r>
               <a:rPr lang="en-FI" sz="3600" dirty="0"/>
-              <a:t>Warm your house just before the weather turns cold and prices rise!</a:t>
+              <a:t>Heat the house just before the weather turns cold and prices rise!</a:t>
             </a:r>
           </a:p>
         </p:txBody>
@@ -6561,8 +6561,8 @@
         </p:nvSpPr>
         <p:spPr>
           <a:xfrm>
-            <a:off x="774700" y="2081493"/>
-            <a:ext cx="4111625" cy="4195481"/>
+            <a:off x="774700" y="1995806"/>
+            <a:ext cx="4111625" cy="4719636"/>
           </a:xfrm>
         </p:spPr>
         <p:txBody>
@@ -6610,8 +6610,14 @@
           </a:p>
           <a:p>
             <a:r>
-              <a:rPr lang="en-FI" sz="2300" dirty="0"/>
-              <a:t>Just three recommendation levels per hour!</a:t>
+              <a:rPr lang="en-FI" sz="2600" dirty="0"/>
+              <a:t>Just three recommendation levels per hour </a:t>
+            </a:r>
+          </a:p>
+          <a:p>
+            <a:r>
+              <a:rPr lang="en-FI" sz="2600" dirty="0"/>
+              <a:t>One pageload!</a:t>
             </a:r>
           </a:p>
         </p:txBody>

</xml_diff>